<commit_message>
Apresentação Projeto Final v3.0
</commit_message>
<xml_diff>
--- a/Market For You.pptx
+++ b/Market For You.pptx
@@ -296,7 +296,7 @@
           <a:p>
             <a:fld id="{2E700DB3-DBF0-4086-B675-117E7A9610B8}" type="datetimeFigureOut">
               <a:rPr lang="pt-BR" smtClean="0"/>
-              <a:t>19/10/2016</a:t>
+              <a:t>25/10/2016</a:t>
             </a:fld>
             <a:endParaRPr lang="pt-BR"/>
           </a:p>
@@ -461,7 +461,7 @@
           <a:p>
             <a:fld id="{2E700DB3-DBF0-4086-B675-117E7A9610B8}" type="datetimeFigureOut">
               <a:rPr lang="pt-BR" smtClean="0"/>
-              <a:t>19/10/2016</a:t>
+              <a:t>25/10/2016</a:t>
             </a:fld>
             <a:endParaRPr lang="pt-BR"/>
           </a:p>
@@ -636,7 +636,7 @@
           <a:p>
             <a:fld id="{2E700DB3-DBF0-4086-B675-117E7A9610B8}" type="datetimeFigureOut">
               <a:rPr lang="pt-BR" smtClean="0"/>
-              <a:t>19/10/2016</a:t>
+              <a:t>25/10/2016</a:t>
             </a:fld>
             <a:endParaRPr lang="pt-BR"/>
           </a:p>
@@ -801,7 +801,7 @@
           <a:p>
             <a:fld id="{2E700DB3-DBF0-4086-B675-117E7A9610B8}" type="datetimeFigureOut">
               <a:rPr lang="pt-BR" smtClean="0"/>
-              <a:t>19/10/2016</a:t>
+              <a:t>25/10/2016</a:t>
             </a:fld>
             <a:endParaRPr lang="pt-BR"/>
           </a:p>
@@ -1042,7 +1042,7 @@
           <a:p>
             <a:fld id="{2E700DB3-DBF0-4086-B675-117E7A9610B8}" type="datetimeFigureOut">
               <a:rPr lang="pt-BR" smtClean="0"/>
-              <a:t>19/10/2016</a:t>
+              <a:t>25/10/2016</a:t>
             </a:fld>
             <a:endParaRPr lang="pt-BR"/>
           </a:p>
@@ -1325,7 +1325,7 @@
           <a:p>
             <a:fld id="{2E700DB3-DBF0-4086-B675-117E7A9610B8}" type="datetimeFigureOut">
               <a:rPr lang="pt-BR" smtClean="0"/>
-              <a:t>19/10/2016</a:t>
+              <a:t>25/10/2016</a:t>
             </a:fld>
             <a:endParaRPr lang="pt-BR"/>
           </a:p>
@@ -1742,7 +1742,7 @@
           <a:p>
             <a:fld id="{2E700DB3-DBF0-4086-B675-117E7A9610B8}" type="datetimeFigureOut">
               <a:rPr lang="pt-BR" smtClean="0"/>
-              <a:t>19/10/2016</a:t>
+              <a:t>25/10/2016</a:t>
             </a:fld>
             <a:endParaRPr lang="pt-BR"/>
           </a:p>
@@ -1855,7 +1855,7 @@
           <a:p>
             <a:fld id="{2E700DB3-DBF0-4086-B675-117E7A9610B8}" type="datetimeFigureOut">
               <a:rPr lang="pt-BR" smtClean="0"/>
-              <a:t>19/10/2016</a:t>
+              <a:t>25/10/2016</a:t>
             </a:fld>
             <a:endParaRPr lang="pt-BR"/>
           </a:p>
@@ -1945,7 +1945,7 @@
           <a:p>
             <a:fld id="{2E700DB3-DBF0-4086-B675-117E7A9610B8}" type="datetimeFigureOut">
               <a:rPr lang="pt-BR" smtClean="0"/>
-              <a:t>19/10/2016</a:t>
+              <a:t>25/10/2016</a:t>
             </a:fld>
             <a:endParaRPr lang="pt-BR"/>
           </a:p>
@@ -2217,7 +2217,7 @@
           <a:p>
             <a:fld id="{2E700DB3-DBF0-4086-B675-117E7A9610B8}" type="datetimeFigureOut">
               <a:rPr lang="pt-BR" smtClean="0"/>
-              <a:t>19/10/2016</a:t>
+              <a:t>25/10/2016</a:t>
             </a:fld>
             <a:endParaRPr lang="pt-BR"/>
           </a:p>
@@ -2465,7 +2465,7 @@
           <a:p>
             <a:fld id="{2E700DB3-DBF0-4086-B675-117E7A9610B8}" type="datetimeFigureOut">
               <a:rPr lang="pt-BR" smtClean="0"/>
-              <a:t>19/10/2016</a:t>
+              <a:t>25/10/2016</a:t>
             </a:fld>
             <a:endParaRPr lang="pt-BR"/>
           </a:p>
@@ -2682,7 +2682,7 @@
           <a:p>
             <a:fld id="{2E700DB3-DBF0-4086-B675-117E7A9610B8}" type="datetimeFigureOut">
               <a:rPr lang="pt-BR" smtClean="0"/>
-              <a:t>19/10/2016</a:t>
+              <a:t>25/10/2016</a:t>
             </a:fld>
             <a:endParaRPr lang="pt-BR"/>
           </a:p>
@@ -3763,7 +3763,15 @@
             </a:pPr>
             <a:r>
               <a:rPr lang="pt-BR" sz="2400" dirty="0" smtClean="0"/>
-              <a:t>Parcerias com Supermercados;</a:t>
+              <a:t>Mensalidades</a:t>
+            </a:r>
+            <a:r>
+              <a:rPr lang="pt-BR" sz="2400" dirty="0" smtClean="0"/>
+              <a:t> dos Supermercados</a:t>
+            </a:r>
+            <a:r>
+              <a:rPr lang="pt-BR" sz="2400" dirty="0" smtClean="0"/>
+              <a:t>;</a:t>
             </a:r>
             <a:endParaRPr lang="pt-BR" sz="2400" dirty="0"/>
           </a:p>
@@ -3777,8 +3785,13 @@
             </a:pPr>
             <a:r>
               <a:rPr lang="pt-BR" sz="2400" dirty="0" smtClean="0"/>
-              <a:t>Comissão pelos acessos feitos no site;</a:t>
-            </a:r>
+              <a:t>Anúncios que possam ser colocados </a:t>
+            </a:r>
+            <a:r>
+              <a:rPr lang="pt-BR" sz="2400" smtClean="0"/>
+              <a:t>no site; </a:t>
+            </a:r>
+            <a:endParaRPr lang="pt-BR" sz="2400" dirty="0" smtClean="0"/>
           </a:p>
           <a:p>
             <a:pPr>
@@ -3995,13 +4008,7 @@
               <a:rPr lang="pt-BR" sz="4000" b="1" dirty="0" smtClean="0">
                 <a:latin typeface="+mj-lt"/>
               </a:rPr>
-              <a:t>Mode</a:t>
-            </a:r>
-            <a:r>
-              <a:rPr lang="pt-BR" sz="4000" b="1" dirty="0" smtClean="0">
-                <a:latin typeface="+mj-lt"/>
-              </a:rPr>
-              <a:t>lo Banco de Dados</a:t>
+              <a:t>Modelo Banco de Dados</a:t>
             </a:r>
             <a:endParaRPr lang="pt-BR" sz="4000" b="1" dirty="0">
               <a:latin typeface="+mj-lt"/>
@@ -4011,7 +4018,7 @@
       </p:sp>
       <p:pic>
         <p:nvPicPr>
-          <p:cNvPr id="1026" name="Picture 2"/>
+          <p:cNvPr id="1027" name="Picture 3"/>
           <p:cNvPicPr>
             <a:picLocks noChangeAspect="1" noChangeArrowheads="1"/>
           </p:cNvPicPr>
@@ -4025,13 +4032,13 @@
               </a:ext>
             </a:extLst>
           </a:blip>
-          <a:srcRect l="9515" t="19886" r="26563" b="19129"/>
+          <a:srcRect l="9039" t="21093" r="23750" b="17259"/>
           <a:stretch/>
         </p:blipFill>
         <p:spPr bwMode="auto">
           <a:xfrm>
-            <a:off x="1403648" y="1844824"/>
-            <a:ext cx="6234545" cy="4461165"/>
+            <a:off x="1187625" y="1844824"/>
+            <a:ext cx="6408712" cy="4408635"/>
           </a:xfrm>
           <a:prstGeom prst="rect">
             <a:avLst/>

</xml_diff>